<commit_message>
added columns to table
</commit_message>
<xml_diff>
--- a/filesets/demo/AgeReport.pptx
+++ b/filesets/demo/AgeReport.pptx
@@ -198,7 +198,7 @@
           <a:p>
             <a:fld id="{8B9BD9A1-A981-5248-BB0F-33986E75BC56}" type="datetimeFigureOut">
               <a:rPr lang="en-US" smtClean="0"/>
-              <a:t>6/24/20</a:t>
+              <a:t>8/13/20</a:t>
             </a:fld>
             <a:endParaRPr lang="en-US"/>
           </a:p>
@@ -1574,14 +1574,14 @@
           <p:nvPr>
             <p:extLst>
               <p:ext uri="{D42A27DB-BD31-4B8C-83A1-F6EECF244321}">
-                <p14:modId xmlns:p14="http://schemas.microsoft.com/office/powerpoint/2010/main" val="1338378015"/>
+                <p14:modId xmlns:p14="http://schemas.microsoft.com/office/powerpoint/2010/main" val="1422765226"/>
               </p:ext>
             </p:extLst>
           </p:nvPr>
         </p:nvGraphicFramePr>
         <p:xfrm>
           <a:off x="1497610" y="2053935"/>
-          <a:ext cx="8905176" cy="1112520"/>
+          <a:ext cx="8905176" cy="3337560"/>
         </p:xfrm>
         <a:graphic>
           <a:graphicData uri="http://schemas.openxmlformats.org/drawingml/2006/table">
@@ -1768,7 +1768,7 @@
                     <a:bodyPr/>
                     <a:lstStyle/>
                     <a:p>
-                      <a:endParaRPr lang="en-US"/>
+                      <a:endParaRPr lang="en-US" dirty="0"/>
                     </a:p>
                   </a:txBody>
                   <a:tcPr/>
@@ -1796,6 +1796,288 @@
                 <a:extLst>
                   <a:ext uri="{0D108BD9-81ED-4DB2-BD59-A6C34878D82A}">
                     <a16:rowId xmlns:a16="http://schemas.microsoft.com/office/drawing/2014/main" val="869932105"/>
+                  </a:ext>
+                </a:extLst>
+              </a:tr>
+              <a:tr h="370840">
+                <a:tc>
+                  <a:txBody>
+                    <a:bodyPr/>
+                    <a:lstStyle/>
+                    <a:p>
+                      <a:endParaRPr lang="en-US" dirty="0"/>
+                    </a:p>
+                  </a:txBody>
+                  <a:tcPr/>
+                </a:tc>
+                <a:tc>
+                  <a:txBody>
+                    <a:bodyPr/>
+                    <a:lstStyle/>
+                    <a:p>
+                      <a:endParaRPr lang="en-US" dirty="0"/>
+                    </a:p>
+                  </a:txBody>
+                  <a:tcPr/>
+                </a:tc>
+                <a:tc>
+                  <a:txBody>
+                    <a:bodyPr/>
+                    <a:lstStyle/>
+                    <a:p>
+                      <a:endParaRPr lang="en-US" dirty="0"/>
+                    </a:p>
+                  </a:txBody>
+                  <a:tcPr/>
+                </a:tc>
+                <a:tc>
+                  <a:txBody>
+                    <a:bodyPr/>
+                    <a:lstStyle/>
+                    <a:p>
+                      <a:endParaRPr lang="en-US" dirty="0"/>
+                    </a:p>
+                  </a:txBody>
+                  <a:tcPr/>
+                </a:tc>
+                <a:extLst>
+                  <a:ext uri="{0D108BD9-81ED-4DB2-BD59-A6C34878D82A}">
+                    <a16:rowId xmlns:a16="http://schemas.microsoft.com/office/drawing/2014/main" val="4114687216"/>
+                  </a:ext>
+                </a:extLst>
+              </a:tr>
+              <a:tr h="370840">
+                <a:tc>
+                  <a:txBody>
+                    <a:bodyPr/>
+                    <a:lstStyle/>
+                    <a:p>
+                      <a:endParaRPr lang="en-US" dirty="0"/>
+                    </a:p>
+                  </a:txBody>
+                  <a:tcPr/>
+                </a:tc>
+                <a:tc>
+                  <a:txBody>
+                    <a:bodyPr/>
+                    <a:lstStyle/>
+                    <a:p>
+                      <a:endParaRPr lang="en-US" dirty="0"/>
+                    </a:p>
+                  </a:txBody>
+                  <a:tcPr/>
+                </a:tc>
+                <a:tc>
+                  <a:txBody>
+                    <a:bodyPr/>
+                    <a:lstStyle/>
+                    <a:p>
+                      <a:endParaRPr lang="en-US" dirty="0"/>
+                    </a:p>
+                  </a:txBody>
+                  <a:tcPr/>
+                </a:tc>
+                <a:tc>
+                  <a:txBody>
+                    <a:bodyPr/>
+                    <a:lstStyle/>
+                    <a:p>
+                      <a:endParaRPr lang="en-US" dirty="0"/>
+                    </a:p>
+                  </a:txBody>
+                  <a:tcPr/>
+                </a:tc>
+                <a:extLst>
+                  <a:ext uri="{0D108BD9-81ED-4DB2-BD59-A6C34878D82A}">
+                    <a16:rowId xmlns:a16="http://schemas.microsoft.com/office/drawing/2014/main" val="288501345"/>
+                  </a:ext>
+                </a:extLst>
+              </a:tr>
+              <a:tr h="370840">
+                <a:tc>
+                  <a:txBody>
+                    <a:bodyPr/>
+                    <a:lstStyle/>
+                    <a:p>
+                      <a:endParaRPr lang="en-US" dirty="0"/>
+                    </a:p>
+                  </a:txBody>
+                  <a:tcPr/>
+                </a:tc>
+                <a:tc>
+                  <a:txBody>
+                    <a:bodyPr/>
+                    <a:lstStyle/>
+                    <a:p>
+                      <a:endParaRPr lang="en-US" dirty="0"/>
+                    </a:p>
+                  </a:txBody>
+                  <a:tcPr/>
+                </a:tc>
+                <a:tc>
+                  <a:txBody>
+                    <a:bodyPr/>
+                    <a:lstStyle/>
+                    <a:p>
+                      <a:endParaRPr lang="en-US" dirty="0"/>
+                    </a:p>
+                  </a:txBody>
+                  <a:tcPr/>
+                </a:tc>
+                <a:tc>
+                  <a:txBody>
+                    <a:bodyPr/>
+                    <a:lstStyle/>
+                    <a:p>
+                      <a:endParaRPr lang="en-US" dirty="0"/>
+                    </a:p>
+                  </a:txBody>
+                  <a:tcPr/>
+                </a:tc>
+                <a:extLst>
+                  <a:ext uri="{0D108BD9-81ED-4DB2-BD59-A6C34878D82A}">
+                    <a16:rowId xmlns:a16="http://schemas.microsoft.com/office/drawing/2014/main" val="1699171571"/>
+                  </a:ext>
+                </a:extLst>
+              </a:tr>
+              <a:tr h="370840">
+                <a:tc>
+                  <a:txBody>
+                    <a:bodyPr/>
+                    <a:lstStyle/>
+                    <a:p>
+                      <a:endParaRPr lang="en-US" dirty="0"/>
+                    </a:p>
+                  </a:txBody>
+                  <a:tcPr/>
+                </a:tc>
+                <a:tc>
+                  <a:txBody>
+                    <a:bodyPr/>
+                    <a:lstStyle/>
+                    <a:p>
+                      <a:endParaRPr lang="en-US" dirty="0"/>
+                    </a:p>
+                  </a:txBody>
+                  <a:tcPr/>
+                </a:tc>
+                <a:tc>
+                  <a:txBody>
+                    <a:bodyPr/>
+                    <a:lstStyle/>
+                    <a:p>
+                      <a:endParaRPr lang="en-US" dirty="0"/>
+                    </a:p>
+                  </a:txBody>
+                  <a:tcPr/>
+                </a:tc>
+                <a:tc>
+                  <a:txBody>
+                    <a:bodyPr/>
+                    <a:lstStyle/>
+                    <a:p>
+                      <a:endParaRPr lang="en-US" dirty="0"/>
+                    </a:p>
+                  </a:txBody>
+                  <a:tcPr/>
+                </a:tc>
+                <a:extLst>
+                  <a:ext uri="{0D108BD9-81ED-4DB2-BD59-A6C34878D82A}">
+                    <a16:rowId xmlns:a16="http://schemas.microsoft.com/office/drawing/2014/main" val="483102540"/>
+                  </a:ext>
+                </a:extLst>
+              </a:tr>
+              <a:tr h="370840">
+                <a:tc>
+                  <a:txBody>
+                    <a:bodyPr/>
+                    <a:lstStyle/>
+                    <a:p>
+                      <a:endParaRPr lang="en-US" dirty="0"/>
+                    </a:p>
+                  </a:txBody>
+                  <a:tcPr/>
+                </a:tc>
+                <a:tc>
+                  <a:txBody>
+                    <a:bodyPr/>
+                    <a:lstStyle/>
+                    <a:p>
+                      <a:endParaRPr lang="en-US" dirty="0"/>
+                    </a:p>
+                  </a:txBody>
+                  <a:tcPr/>
+                </a:tc>
+                <a:tc>
+                  <a:txBody>
+                    <a:bodyPr/>
+                    <a:lstStyle/>
+                    <a:p>
+                      <a:endParaRPr lang="en-US" dirty="0"/>
+                    </a:p>
+                  </a:txBody>
+                  <a:tcPr/>
+                </a:tc>
+                <a:tc>
+                  <a:txBody>
+                    <a:bodyPr/>
+                    <a:lstStyle/>
+                    <a:p>
+                      <a:endParaRPr lang="en-US" dirty="0"/>
+                    </a:p>
+                  </a:txBody>
+                  <a:tcPr/>
+                </a:tc>
+                <a:extLst>
+                  <a:ext uri="{0D108BD9-81ED-4DB2-BD59-A6C34878D82A}">
+                    <a16:rowId xmlns:a16="http://schemas.microsoft.com/office/drawing/2014/main" val="2908448464"/>
+                  </a:ext>
+                </a:extLst>
+              </a:tr>
+              <a:tr h="370840">
+                <a:tc>
+                  <a:txBody>
+                    <a:bodyPr/>
+                    <a:lstStyle/>
+                    <a:p>
+                      <a:endParaRPr lang="en-US" dirty="0"/>
+                    </a:p>
+                  </a:txBody>
+                  <a:tcPr/>
+                </a:tc>
+                <a:tc>
+                  <a:txBody>
+                    <a:bodyPr/>
+                    <a:lstStyle/>
+                    <a:p>
+                      <a:endParaRPr lang="en-US" dirty="0"/>
+                    </a:p>
+                  </a:txBody>
+                  <a:tcPr/>
+                </a:tc>
+                <a:tc>
+                  <a:txBody>
+                    <a:bodyPr/>
+                    <a:lstStyle/>
+                    <a:p>
+                      <a:endParaRPr lang="en-US" dirty="0"/>
+                    </a:p>
+                  </a:txBody>
+                  <a:tcPr/>
+                </a:tc>
+                <a:tc>
+                  <a:txBody>
+                    <a:bodyPr/>
+                    <a:lstStyle/>
+                    <a:p>
+                      <a:endParaRPr lang="en-US" dirty="0"/>
+                    </a:p>
+                  </a:txBody>
+                  <a:tcPr/>
+                </a:tc>
+                <a:extLst>
+                  <a:ext uri="{0D108BD9-81ED-4DB2-BD59-A6C34878D82A}">
+                    <a16:rowId xmlns:a16="http://schemas.microsoft.com/office/drawing/2014/main" val="1260128148"/>
                   </a:ext>
                 </a:extLst>
               </a:tr>
@@ -2373,6 +2655,15 @@
 </file>
 
 <file path=customXml/item1.xml><?xml version="1.0" encoding="utf-8"?>
+<?mso-contentType ?>
+<FormTemplates xmlns="http://schemas.microsoft.com/sharepoint/v3/contenttype/forms">
+  <Display>DocumentLibraryForm</Display>
+  <Edit>DocumentLibraryForm</Edit>
+  <New>DocumentLibraryForm</New>
+</FormTemplates>
+</file>
+
+<file path=customXml/item2.xml><?xml version="1.0" encoding="utf-8"?>
 <ct:contentTypeSchema xmlns:ct="http://schemas.microsoft.com/office/2006/metadata/contentType" xmlns:ma="http://schemas.microsoft.com/office/2006/metadata/properties/metaAttributes" ct:_="" ma:_="" ma:contentTypeName="Document" ma:contentTypeID="0x01010005CC00D66F8C3D498D58D8B3330ED23C" ma:contentTypeVersion="11" ma:contentTypeDescription="Create a new document." ma:contentTypeScope="" ma:versionID="11126f0687a46f95933db40d99b94a3b">
   <xsd:schema xmlns:xsd="http://www.w3.org/2001/XMLSchema" xmlns:xs="http://www.w3.org/2001/XMLSchema" xmlns:p="http://schemas.microsoft.com/office/2006/metadata/properties" xmlns:ns2="56123433-40cc-482a-838d-44eebed83084" xmlns:ns3="7d2247ee-dcae-49b5-8e6a-08fc19cc9b93" targetNamespace="http://schemas.microsoft.com/office/2006/metadata/properties" ma:root="true" ma:fieldsID="82e815043d4527580b826b1c9af8fe45" ns2:_="" ns3:_="">
     <xsd:import namespace="56123433-40cc-482a-838d-44eebed83084"/>
@@ -2583,15 +2874,6 @@
 </ct:contentTypeSchema>
 </file>
 
-<file path=customXml/item2.xml><?xml version="1.0" encoding="utf-8"?>
-<?mso-contentType ?>
-<FormTemplates xmlns="http://schemas.microsoft.com/sharepoint/v3/contenttype/forms">
-  <Display>DocumentLibraryForm</Display>
-  <Edit>DocumentLibraryForm</Edit>
-  <New>DocumentLibraryForm</New>
-</FormTemplates>
-</file>
-
 <file path=customXml/item3.xml><?xml version="1.0" encoding="utf-8"?>
 <p:properties xmlns:p="http://schemas.microsoft.com/office/2006/metadata/properties" xmlns:xsi="http://www.w3.org/2001/XMLSchema-instance" xmlns:pc="http://schemas.microsoft.com/office/infopath/2007/PartnerControls">
   <documentManagement/>
@@ -2599,6 +2881,14 @@
 </file>
 
 <file path=customXml/itemProps1.xml><?xml version="1.0" encoding="utf-8"?>
+<ds:datastoreItem xmlns:ds="http://schemas.openxmlformats.org/officeDocument/2006/customXml" ds:itemID="{027D0A69-7C10-4C42-B337-3FE1EF648C0F}">
+  <ds:schemaRefs>
+    <ds:schemaRef ds:uri="http://schemas.microsoft.com/sharepoint/v3/contenttype/forms"/>
+  </ds:schemaRefs>
+</ds:datastoreItem>
+</file>
+
+<file path=customXml/itemProps2.xml><?xml version="1.0" encoding="utf-8"?>
 <ds:datastoreItem xmlns:ds="http://schemas.openxmlformats.org/officeDocument/2006/customXml" ds:itemID="{178CAD29-7858-4B69-9F9F-0399F0F7EA67}">
   <ds:schemaRefs>
     <ds:schemaRef ds:uri="http://schemas.microsoft.com/office/2006/metadata/contentType"/>
@@ -2613,14 +2903,6 @@
     <ds:schemaRef ds:uri="http://purl.org/dc/elements/1.1/"/>
     <ds:schemaRef ds:uri="http://purl.org/dc/terms/"/>
     <ds:schemaRef ds:uri="http://schemas.microsoft.com/internal/obd"/>
-  </ds:schemaRefs>
-</ds:datastoreItem>
-</file>
-
-<file path=customXml/itemProps2.xml><?xml version="1.0" encoding="utf-8"?>
-<ds:datastoreItem xmlns:ds="http://schemas.openxmlformats.org/officeDocument/2006/customXml" ds:itemID="{027D0A69-7C10-4C42-B337-3FE1EF648C0F}">
-  <ds:schemaRefs>
-    <ds:schemaRef ds:uri="http://schemas.microsoft.com/sharepoint/v3/contenttype/forms"/>
   </ds:schemaRefs>
 </ds:datastoreItem>
 </file>

</xml_diff>

<commit_message>
updates to demo, including new pg3
</commit_message>
<xml_diff>
--- a/filesets/demo/AgeReport.pptx
+++ b/filesets/demo/AgeReport.pptx
@@ -5,11 +5,12 @@
     <p:sldMasterId id="2147483660" r:id="rId4"/>
   </p:sldMasterIdLst>
   <p:notesMasterIdLst>
-    <p:notesMasterId r:id="rId7"/>
+    <p:notesMasterId r:id="rId8"/>
   </p:notesMasterIdLst>
   <p:sldIdLst>
     <p:sldId id="2139118630" r:id="rId5"/>
     <p:sldId id="2139118631" r:id="rId6"/>
+    <p:sldId id="2139118633" r:id="rId7"/>
   </p:sldIdLst>
   <p:sldSz cx="12192000" cy="6858000"/>
   <p:notesSz cx="6858000" cy="9144000"/>
@@ -198,7 +199,7 @@
           <a:p>
             <a:fld id="{8B9BD9A1-A981-5248-BB0F-33986E75BC56}" type="datetimeFigureOut">
               <a:rPr lang="en-US" smtClean="0"/>
-              <a:t>9/30/2020</a:t>
+              <a:t>10/14/20</a:t>
             </a:fld>
             <a:endParaRPr lang="en-US"/>
           </a:p>
@@ -463,6 +464,90 @@
     </a:lvl9pPr>
   </p:notesStyle>
 </p:notesMaster>
+</file>
+
+<file path=ppt/notesSlides/notesSlide1.xml><?xml version="1.0" encoding="utf-8"?>
+<p:notes xmlns:a="http://schemas.openxmlformats.org/drawingml/2006/main" xmlns:r="http://schemas.openxmlformats.org/officeDocument/2006/relationships" xmlns:p="http://schemas.openxmlformats.org/presentationml/2006/main">
+  <p:cSld>
+    <p:spTree>
+      <p:nvGrpSpPr>
+        <p:cNvPr id="1" name=""/>
+        <p:cNvGrpSpPr/>
+        <p:nvPr/>
+      </p:nvGrpSpPr>
+      <p:grpSpPr>
+        <a:xfrm>
+          <a:off x="0" y="0"/>
+          <a:ext cx="0" cy="0"/>
+          <a:chOff x="0" y="0"/>
+          <a:chExt cx="0" cy="0"/>
+        </a:xfrm>
+      </p:grpSpPr>
+      <p:sp>
+        <p:nvSpPr>
+          <p:cNvPr id="2" name="Slide Image Placeholder 1"/>
+          <p:cNvSpPr>
+            <a:spLocks noGrp="1" noRot="1" noChangeAspect="1"/>
+          </p:cNvSpPr>
+          <p:nvPr>
+            <p:ph type="sldImg"/>
+          </p:nvPr>
+        </p:nvSpPr>
+        <p:spPr/>
+      </p:sp>
+      <p:sp>
+        <p:nvSpPr>
+          <p:cNvPr id="3" name="Notes Placeholder 2"/>
+          <p:cNvSpPr>
+            <a:spLocks noGrp="1"/>
+          </p:cNvSpPr>
+          <p:nvPr>
+            <p:ph type="body" idx="1"/>
+          </p:nvPr>
+        </p:nvSpPr>
+        <p:spPr/>
+        <p:txBody>
+          <a:bodyPr/>
+          <a:lstStyle/>
+          <a:p>
+            <a:endParaRPr lang="en-US" dirty="0"/>
+          </a:p>
+        </p:txBody>
+      </p:sp>
+      <p:sp>
+        <p:nvSpPr>
+          <p:cNvPr id="4" name="Slide Number Placeholder 3"/>
+          <p:cNvSpPr>
+            <a:spLocks noGrp="1"/>
+          </p:cNvSpPr>
+          <p:nvPr>
+            <p:ph type="sldNum" sz="quarter" idx="5"/>
+          </p:nvPr>
+        </p:nvSpPr>
+        <p:spPr/>
+        <p:txBody>
+          <a:bodyPr/>
+          <a:lstStyle/>
+          <a:p>
+            <a:fld id="{B3BC01EB-0159-E64B-B074-E84F20C54F65}" type="slidenum">
+              <a:rPr lang="en-US" smtClean="0"/>
+              <a:t>3</a:t>
+            </a:fld>
+            <a:endParaRPr lang="en-US"/>
+          </a:p>
+        </p:txBody>
+      </p:sp>
+    </p:spTree>
+    <p:extLst>
+      <p:ext uri="{BB962C8B-B14F-4D97-AF65-F5344CB8AC3E}">
+        <p14:creationId xmlns:p14="http://schemas.microsoft.com/office/powerpoint/2010/main" val="1902921425"/>
+      </p:ext>
+    </p:extLst>
+  </p:cSld>
+  <p:clrMapOvr>
+    <a:masterClrMapping/>
+  </p:clrMapOvr>
+</p:notes>
 </file>
 
 <file path=ppt/slideLayouts/slideLayout1.xml><?xml version="1.0" encoding="utf-8"?>
@@ -1416,6 +1501,9 @@
           <a:prstGeom prst="rect">
             <a:avLst/>
           </a:prstGeom>
+          <a:ln>
+            <a:noFill/>
+          </a:ln>
         </p:spPr>
         <p:style>
           <a:lnRef idx="2">
@@ -2085,6 +2173,973 @@
     <p:extLst>
       <p:ext uri="{BB962C8B-B14F-4D97-AF65-F5344CB8AC3E}">
         <p14:creationId xmlns:p14="http://schemas.microsoft.com/office/powerpoint/2010/main" val="2627689590"/>
+      </p:ext>
+    </p:extLst>
+  </p:cSld>
+  <p:clrMapOvr>
+    <a:masterClrMapping/>
+  </p:clrMapOvr>
+</p:sld>
+</file>
+
+<file path=ppt/slides/slide3.xml><?xml version="1.0" encoding="utf-8"?>
+<p:sld xmlns:a="http://schemas.openxmlformats.org/drawingml/2006/main" xmlns:r="http://schemas.openxmlformats.org/officeDocument/2006/relationships" xmlns:p="http://schemas.openxmlformats.org/presentationml/2006/main">
+  <p:cSld>
+    <p:spTree>
+      <p:nvGrpSpPr>
+        <p:cNvPr id="1" name=""/>
+        <p:cNvGrpSpPr/>
+        <p:nvPr/>
+      </p:nvGrpSpPr>
+      <p:grpSpPr>
+        <a:xfrm>
+          <a:off x="0" y="0"/>
+          <a:ext cx="0" cy="0"/>
+          <a:chOff x="0" y="0"/>
+          <a:chExt cx="0" cy="0"/>
+        </a:xfrm>
+      </p:grpSpPr>
+      <p:sp>
+        <p:nvSpPr>
+          <p:cNvPr id="2" name="Content Placeholder 1" descr="/*{{values:birthday.csv}}*/">
+            <a:extLst>
+              <a:ext uri="{FF2B5EF4-FFF2-40B4-BE49-F238E27FC236}">
+                <a16:creationId xmlns:a16="http://schemas.microsoft.com/office/drawing/2014/main" id="{F97D998F-66F4-C946-B466-CDDEBACD4777}"/>
+              </a:ext>
+            </a:extLst>
+          </p:cNvPr>
+          <p:cNvSpPr>
+            <a:spLocks noGrp="1"/>
+          </p:cNvSpPr>
+          <p:nvPr>
+            <p:ph sz="quarter" idx="15"/>
+          </p:nvPr>
+        </p:nvSpPr>
+        <p:spPr>
+          <a:xfrm>
+            <a:off x="587482" y="1286925"/>
+            <a:ext cx="10724463" cy="2286918"/>
+          </a:xfrm>
+        </p:spPr>
+        <p:txBody>
+          <a:bodyPr/>
+          <a:lstStyle/>
+          <a:p>
+            <a:pPr marL="0" indent="0">
+              <a:buNone/>
+            </a:pPr>
+            <a:r>
+              <a:rPr lang="en-US" sz="2400" dirty="0"/>
+              <a:t>Process substitutes key words with values found in local post-run files</a:t>
+            </a:r>
+            <a:r>
+              <a:rPr lang="en-US" sz="2000" dirty="0"/>
+              <a:t>   </a:t>
+            </a:r>
+            <a:br>
+              <a:rPr lang="en-US" sz="2000" dirty="0"/>
+            </a:br>
+            <a:r>
+              <a:rPr lang="en-US" sz="2000" dirty="0"/>
+              <a:t>Three substitution commands available...   general rules:</a:t>
+            </a:r>
+          </a:p>
+          <a:p>
+            <a:pPr marL="628650" lvl="1" indent="-285750"/>
+            <a:r>
+              <a:rPr lang="en-US" sz="1600" dirty="0"/>
+              <a:t>Substitutions must be wrapped in double {{ and }}  (omitted below to prevent errors)</a:t>
+            </a:r>
+          </a:p>
+          <a:p>
+            <a:pPr marL="628650" lvl="1" indent="-285750"/>
+            <a:r>
+              <a:rPr lang="en-US" sz="1600" dirty="0"/>
+              <a:t>Row 0 == header row</a:t>
+            </a:r>
+          </a:p>
+          <a:p>
+            <a:pPr marL="628650" lvl="1" indent="-285750"/>
+            <a:r>
+              <a:rPr lang="en-US" sz="1600" dirty="0"/>
+              <a:t>Text formatting based on the first character found… if none, then master slide default is applied</a:t>
+            </a:r>
+          </a:p>
+          <a:p>
+            <a:pPr marL="628650" lvl="1" indent="-285750"/>
+            <a:r>
+              <a:rPr lang="en-US" sz="1600" dirty="0"/>
+              <a:t>To see the pre-substitution deck, look in the “1_download” folder</a:t>
+            </a:r>
+          </a:p>
+          <a:p>
+            <a:pPr lvl="1"/>
+            <a:endParaRPr lang="en-US" sz="1600" dirty="0"/>
+          </a:p>
+        </p:txBody>
+      </p:sp>
+      <p:sp>
+        <p:nvSpPr>
+          <p:cNvPr id="3" name="Title 2">
+            <a:extLst>
+              <a:ext uri="{FF2B5EF4-FFF2-40B4-BE49-F238E27FC236}">
+                <a16:creationId xmlns:a16="http://schemas.microsoft.com/office/drawing/2014/main" id="{D1271FB2-6A94-6049-ADA9-8120440C550F}"/>
+              </a:ext>
+            </a:extLst>
+          </p:cNvPr>
+          <p:cNvSpPr>
+            <a:spLocks noGrp="1"/>
+          </p:cNvSpPr>
+          <p:nvPr>
+            <p:ph type="title"/>
+          </p:nvPr>
+        </p:nvSpPr>
+        <p:spPr/>
+        <p:txBody>
+          <a:bodyPr/>
+          <a:lstStyle/>
+          <a:p>
+            <a:r>
+              <a:rPr lang="en-US" dirty="0"/>
+              <a:t>How does this work?</a:t>
+            </a:r>
+          </a:p>
+        </p:txBody>
+      </p:sp>
+      <p:sp>
+        <p:nvSpPr>
+          <p:cNvPr id="4" name="TextBox 3">
+            <a:extLst>
+              <a:ext uri="{FF2B5EF4-FFF2-40B4-BE49-F238E27FC236}">
+                <a16:creationId xmlns:a16="http://schemas.microsoft.com/office/drawing/2014/main" id="{63E7C487-6569-1E48-902A-EF06C9DBEFFF}"/>
+              </a:ext>
+            </a:extLst>
+          </p:cNvPr>
+          <p:cNvSpPr txBox="1"/>
+          <p:nvPr/>
+        </p:nvSpPr>
+        <p:spPr>
+          <a:xfrm>
+            <a:off x="741406" y="4312507"/>
+            <a:ext cx="1495168" cy="369332"/>
+          </a:xfrm>
+          <a:prstGeom prst="rect">
+            <a:avLst/>
+          </a:prstGeom>
+          <a:noFill/>
+        </p:spPr>
+        <p:txBody>
+          <a:bodyPr wrap="square" numCol="1" rtlCol="0">
+            <a:spAutoFit/>
+          </a:bodyPr>
+          <a:lstStyle/>
+          <a:p>
+            <a:endParaRPr lang="en-US" dirty="0"/>
+          </a:p>
+        </p:txBody>
+      </p:sp>
+      <p:sp>
+        <p:nvSpPr>
+          <p:cNvPr id="5" name="TextBox 4">
+            <a:extLst>
+              <a:ext uri="{FF2B5EF4-FFF2-40B4-BE49-F238E27FC236}">
+                <a16:creationId xmlns:a16="http://schemas.microsoft.com/office/drawing/2014/main" id="{082878BF-97D3-AD4A-BD96-0E25AE416E17}"/>
+              </a:ext>
+            </a:extLst>
+          </p:cNvPr>
+          <p:cNvSpPr txBox="1"/>
+          <p:nvPr/>
+        </p:nvSpPr>
+        <p:spPr>
+          <a:xfrm>
+            <a:off x="308921" y="3558024"/>
+            <a:ext cx="6172902" cy="1015663"/>
+          </a:xfrm>
+          <a:prstGeom prst="rect">
+            <a:avLst/>
+          </a:prstGeom>
+          <a:noFill/>
+          <a:ln>
+            <a:solidFill>
+              <a:schemeClr val="tx1">
+                <a:lumMod val="60000"/>
+                <a:lumOff val="40000"/>
+              </a:schemeClr>
+            </a:solidFill>
+          </a:ln>
+        </p:spPr>
+        <p:txBody>
+          <a:bodyPr wrap="square" rtlCol="0">
+            <a:spAutoFit/>
+          </a:bodyPr>
+          <a:lstStyle/>
+          <a:p>
+            <a:r>
+              <a:rPr lang="en-US" dirty="0">
+                <a:solidFill>
+                  <a:schemeClr val="accent5">
+                    <a:lumMod val="75000"/>
+                  </a:schemeClr>
+                </a:solidFill>
+              </a:rPr>
+              <a:t>#1 Singular value anywhere in text:   </a:t>
+            </a:r>
+            <a:r>
+              <a:rPr lang="en-US" dirty="0" err="1">
+                <a:solidFill>
+                  <a:srgbClr val="C00000"/>
+                </a:solidFill>
+              </a:rPr>
+              <a:t>val:some.csv</a:t>
+            </a:r>
+            <a:r>
+              <a:rPr lang="en-US" dirty="0">
+                <a:solidFill>
+                  <a:srgbClr val="C00000"/>
+                </a:solidFill>
+              </a:rPr>
+              <a:t>[1:2]</a:t>
+            </a:r>
+          </a:p>
+          <a:p>
+            <a:pPr marL="50800" indent="-285750">
+              <a:buFont typeface="Arial" panose="020B0604020202020204" pitchFamily="34" charset="0"/>
+              <a:buChar char="•"/>
+            </a:pPr>
+            <a:r>
+              <a:rPr lang="en-US" sz="1400" dirty="0" err="1"/>
+              <a:t>example.csv</a:t>
+            </a:r>
+            <a:r>
+              <a:rPr lang="en-US" sz="1400" dirty="0"/>
+              <a:t>[1,2] == row 1, column 2 == “{{</a:t>
+            </a:r>
+            <a:r>
+              <a:rPr lang="en-US" sz="1400" dirty="0" err="1"/>
+              <a:t>val:example.csv</a:t>
+            </a:r>
+            <a:r>
+              <a:rPr lang="en-US" sz="1400" dirty="0"/>
+              <a:t>[1:2]}}” </a:t>
+            </a:r>
+          </a:p>
+          <a:p>
+            <a:pPr marL="50800" indent="-285750">
+              <a:buFont typeface="Arial" panose="020B0604020202020204" pitchFamily="34" charset="0"/>
+              <a:buChar char="•"/>
+            </a:pPr>
+            <a:r>
+              <a:rPr lang="en-US" sz="1400" dirty="0" err="1"/>
+              <a:t>example.csv</a:t>
+            </a:r>
+            <a:r>
+              <a:rPr lang="en-US" sz="1400" dirty="0"/>
+              <a:t>[3,1] == row 3, column 1 == “{{</a:t>
+            </a:r>
+            <a:r>
+              <a:rPr lang="en-US" sz="1400" dirty="0" err="1"/>
+              <a:t>val:example.csv</a:t>
+            </a:r>
+            <a:r>
+              <a:rPr lang="en-US" sz="1400" dirty="0"/>
+              <a:t>[3:1]}}”</a:t>
+            </a:r>
+          </a:p>
+          <a:p>
+            <a:pPr marL="50800" indent="-285750">
+              <a:buFont typeface="Arial" panose="020B0604020202020204" pitchFamily="34" charset="0"/>
+              <a:buChar char="•"/>
+            </a:pPr>
+            <a:r>
+              <a:rPr lang="en-US" sz="1400" dirty="0" err="1"/>
+              <a:t>example.csv</a:t>
+            </a:r>
+            <a:r>
+              <a:rPr lang="en-US" sz="1400" dirty="0"/>
+              <a:t>[0,3] == header, column 3 == “{{</a:t>
+            </a:r>
+            <a:r>
+              <a:rPr lang="en-US" sz="1400" dirty="0" err="1"/>
+              <a:t>val:example.csv</a:t>
+            </a:r>
+            <a:r>
+              <a:rPr lang="en-US" sz="1400" dirty="0"/>
+              <a:t>[0:3]}}” </a:t>
+            </a:r>
+          </a:p>
+        </p:txBody>
+      </p:sp>
+      <p:sp>
+        <p:nvSpPr>
+          <p:cNvPr id="6" name="TextBox 5">
+            <a:extLst>
+              <a:ext uri="{FF2B5EF4-FFF2-40B4-BE49-F238E27FC236}">
+                <a16:creationId xmlns:a16="http://schemas.microsoft.com/office/drawing/2014/main" id="{EFC7648A-C8B8-3240-9EE9-C37A1280FE87}"/>
+              </a:ext>
+            </a:extLst>
+          </p:cNvPr>
+          <p:cNvSpPr txBox="1"/>
+          <p:nvPr/>
+        </p:nvSpPr>
+        <p:spPr>
+          <a:xfrm>
+            <a:off x="308921" y="4681839"/>
+            <a:ext cx="6172902" cy="1015663"/>
+          </a:xfrm>
+          <a:prstGeom prst="rect">
+            <a:avLst/>
+          </a:prstGeom>
+          <a:noFill/>
+          <a:ln>
+            <a:solidFill>
+              <a:schemeClr val="tx1">
+                <a:lumMod val="60000"/>
+                <a:lumOff val="40000"/>
+              </a:schemeClr>
+            </a:solidFill>
+          </a:ln>
+        </p:spPr>
+        <p:txBody>
+          <a:bodyPr wrap="square" rtlCol="0">
+            <a:spAutoFit/>
+          </a:bodyPr>
+          <a:lstStyle/>
+          <a:p>
+            <a:r>
+              <a:rPr lang="en-US" dirty="0">
+                <a:solidFill>
+                  <a:schemeClr val="accent5">
+                    <a:lumMod val="75000"/>
+                  </a:schemeClr>
+                </a:solidFill>
+              </a:rPr>
+              <a:t>#3 Replace box shape with picture:   </a:t>
+            </a:r>
+            <a:r>
+              <a:rPr lang="en-US" dirty="0" err="1">
+                <a:solidFill>
+                  <a:srgbClr val="C00000"/>
+                </a:solidFill>
+              </a:rPr>
+              <a:t>pic:some.png</a:t>
+            </a:r>
+            <a:endParaRPr lang="en-US" dirty="0">
+              <a:solidFill>
+                <a:srgbClr val="C00000"/>
+              </a:solidFill>
+            </a:endParaRPr>
+          </a:p>
+          <a:p>
+            <a:pPr marL="50800" indent="-285750">
+              <a:buFont typeface="Arial" panose="020B0604020202020204" pitchFamily="34" charset="0"/>
+              <a:buChar char="•"/>
+            </a:pPr>
+            <a:r>
+              <a:rPr lang="en-US" sz="1400" dirty="0"/>
+              <a:t>Picture will replace box entirely, including position and shape</a:t>
+            </a:r>
+          </a:p>
+          <a:p>
+            <a:pPr marL="50800" indent="-285750">
+              <a:buFont typeface="Arial" panose="020B0604020202020204" pitchFamily="34" charset="0"/>
+              <a:buChar char="•"/>
+            </a:pPr>
+            <a:r>
+              <a:rPr lang="en-US" sz="1400" dirty="0"/>
+              <a:t>Picture will “stretch” to fit box proportions</a:t>
+            </a:r>
+          </a:p>
+          <a:p>
+            <a:pPr marL="50800" indent="-285750">
+              <a:buFont typeface="Arial" panose="020B0604020202020204" pitchFamily="34" charset="0"/>
+              <a:buChar char="•"/>
+            </a:pPr>
+            <a:r>
+              <a:rPr lang="en-US" sz="1400" dirty="0"/>
+              <a:t>Example picture (TD Logo) below:</a:t>
+            </a:r>
+          </a:p>
+        </p:txBody>
+      </p:sp>
+      <p:graphicFrame>
+        <p:nvGraphicFramePr>
+          <p:cNvPr id="7" name="Table 7">
+            <a:extLst>
+              <a:ext uri="{FF2B5EF4-FFF2-40B4-BE49-F238E27FC236}">
+                <a16:creationId xmlns:a16="http://schemas.microsoft.com/office/drawing/2014/main" id="{64E37EE5-25DD-3949-A067-07E453DADD45}"/>
+              </a:ext>
+            </a:extLst>
+          </p:cNvPr>
+          <p:cNvGraphicFramePr>
+            <a:graphicFrameLocks noGrp="1"/>
+          </p:cNvGraphicFramePr>
+          <p:nvPr>
+            <p:extLst>
+              <p:ext uri="{D42A27DB-BD31-4B8C-83A1-F6EECF244321}">
+                <p14:modId xmlns:p14="http://schemas.microsoft.com/office/powerpoint/2010/main" val="2133739566"/>
+              </p:ext>
+            </p:extLst>
+          </p:nvPr>
+        </p:nvGraphicFramePr>
+        <p:xfrm>
+          <a:off x="6790744" y="5312351"/>
+          <a:ext cx="5196508" cy="1371600"/>
+        </p:xfrm>
+        <a:graphic>
+          <a:graphicData uri="http://schemas.openxmlformats.org/drawingml/2006/table">
+            <a:tbl>
+              <a:tblPr firstRow="1" bandRow="1">
+                <a:tableStyleId>{5C22544A-7EE6-4342-B048-85BDC9FD1C3A}</a:tableStyleId>
+              </a:tblPr>
+              <a:tblGrid>
+                <a:gridCol w="1810444">
+                  <a:extLst>
+                    <a:ext uri="{9D8B030D-6E8A-4147-A177-3AD203B41FA5}">
+                      <a16:colId xmlns:a16="http://schemas.microsoft.com/office/drawing/2014/main" val="4196434234"/>
+                    </a:ext>
+                  </a:extLst>
+                </a:gridCol>
+                <a:gridCol w="1653895">
+                  <a:extLst>
+                    <a:ext uri="{9D8B030D-6E8A-4147-A177-3AD203B41FA5}">
+                      <a16:colId xmlns:a16="http://schemas.microsoft.com/office/drawing/2014/main" val="4055845585"/>
+                    </a:ext>
+                  </a:extLst>
+                </a:gridCol>
+                <a:gridCol w="1732169">
+                  <a:extLst>
+                    <a:ext uri="{9D8B030D-6E8A-4147-A177-3AD203B41FA5}">
+                      <a16:colId xmlns:a16="http://schemas.microsoft.com/office/drawing/2014/main" val="1629493877"/>
+                    </a:ext>
+                  </a:extLst>
+                </a:gridCol>
+              </a:tblGrid>
+              <a:tr h="0">
+                <a:tc>
+                  <a:txBody>
+                    <a:bodyPr/>
+                    <a:lstStyle/>
+                    <a:p>
+                      <a:r>
+                        <a:rPr lang="en-US" sz="900" dirty="0"/>
+                        <a:t>{{</a:t>
+                      </a:r>
+                      <a:r>
+                        <a:rPr lang="en-US" sz="900" dirty="0" err="1"/>
+                        <a:t>col:example.csv</a:t>
+                      </a:r>
+                      <a:r>
+                        <a:rPr lang="en-US" sz="900" dirty="0"/>
+                        <a:t>[1]}}</a:t>
+                      </a:r>
+                    </a:p>
+                  </a:txBody>
+                  <a:tcPr/>
+                </a:tc>
+                <a:tc>
+                  <a:txBody>
+                    <a:bodyPr/>
+                    <a:lstStyle/>
+                    <a:p>
+                      <a:pPr marL="0" marR="0" lvl="0" indent="0" algn="l" defTabSz="914400" rtl="0" eaLnBrk="1" fontAlgn="auto" latinLnBrk="0" hangingPunct="1">
+                        <a:lnSpc>
+                          <a:spcPct val="100000"/>
+                        </a:lnSpc>
+                        <a:spcBef>
+                          <a:spcPts val="0"/>
+                        </a:spcBef>
+                        <a:spcAft>
+                          <a:spcPts val="0"/>
+                        </a:spcAft>
+                        <a:buClrTx/>
+                        <a:buSzTx/>
+                        <a:buFontTx/>
+                        <a:buNone/>
+                        <a:tabLst/>
+                        <a:defRPr/>
+                      </a:pPr>
+                      <a:r>
+                        <a:rPr lang="en-US" sz="900" dirty="0"/>
+                        <a:t>{{</a:t>
+                      </a:r>
+                      <a:r>
+                        <a:rPr lang="en-US" sz="900" dirty="0" err="1"/>
+                        <a:t>col:example.csv</a:t>
+                      </a:r>
+                      <a:r>
+                        <a:rPr lang="en-US" sz="900" dirty="0"/>
+                        <a:t>[2]}}</a:t>
+                      </a:r>
+                    </a:p>
+                  </a:txBody>
+                  <a:tcPr/>
+                </a:tc>
+                <a:tc>
+                  <a:txBody>
+                    <a:bodyPr/>
+                    <a:lstStyle/>
+                    <a:p>
+                      <a:pPr marL="0" marR="0" lvl="0" indent="0" algn="l" defTabSz="914400" rtl="0" eaLnBrk="1" fontAlgn="auto" latinLnBrk="0" hangingPunct="1">
+                        <a:lnSpc>
+                          <a:spcPct val="100000"/>
+                        </a:lnSpc>
+                        <a:spcBef>
+                          <a:spcPts val="0"/>
+                        </a:spcBef>
+                        <a:spcAft>
+                          <a:spcPts val="0"/>
+                        </a:spcAft>
+                        <a:buClrTx/>
+                        <a:buSzTx/>
+                        <a:buFontTx/>
+                        <a:buNone/>
+                        <a:tabLst/>
+                        <a:defRPr/>
+                      </a:pPr>
+                      <a:r>
+                        <a:rPr lang="en-US" sz="900" dirty="0"/>
+                        <a:t>{{</a:t>
+                      </a:r>
+                      <a:r>
+                        <a:rPr lang="en-US" sz="900" dirty="0" err="1"/>
+                        <a:t>col:example.csv</a:t>
+                      </a:r>
+                      <a:r>
+                        <a:rPr lang="en-US" sz="900" dirty="0"/>
+                        <a:t>[3]}}</a:t>
+                      </a:r>
+                    </a:p>
+                  </a:txBody>
+                  <a:tcPr/>
+                </a:tc>
+                <a:extLst>
+                  <a:ext uri="{0D108BD9-81ED-4DB2-BD59-A6C34878D82A}">
+                    <a16:rowId xmlns:a16="http://schemas.microsoft.com/office/drawing/2014/main" val="3459928871"/>
+                  </a:ext>
+                </a:extLst>
+              </a:tr>
+              <a:tr h="183652">
+                <a:tc>
+                  <a:txBody>
+                    <a:bodyPr/>
+                    <a:lstStyle/>
+                    <a:p>
+                      <a:endParaRPr lang="en-US" sz="900" dirty="0"/>
+                    </a:p>
+                  </a:txBody>
+                  <a:tcPr/>
+                </a:tc>
+                <a:tc>
+                  <a:txBody>
+                    <a:bodyPr/>
+                    <a:lstStyle/>
+                    <a:p>
+                      <a:endParaRPr lang="en-US" sz="900" dirty="0"/>
+                    </a:p>
+                  </a:txBody>
+                  <a:tcPr/>
+                </a:tc>
+                <a:tc>
+                  <a:txBody>
+                    <a:bodyPr/>
+                    <a:lstStyle/>
+                    <a:p>
+                      <a:endParaRPr lang="en-US" sz="900"/>
+                    </a:p>
+                  </a:txBody>
+                  <a:tcPr/>
+                </a:tc>
+                <a:extLst>
+                  <a:ext uri="{0D108BD9-81ED-4DB2-BD59-A6C34878D82A}">
+                    <a16:rowId xmlns:a16="http://schemas.microsoft.com/office/drawing/2014/main" val="3432144099"/>
+                  </a:ext>
+                </a:extLst>
+              </a:tr>
+              <a:tr h="0">
+                <a:tc>
+                  <a:txBody>
+                    <a:bodyPr/>
+                    <a:lstStyle/>
+                    <a:p>
+                      <a:endParaRPr lang="en-US" sz="900" dirty="0"/>
+                    </a:p>
+                  </a:txBody>
+                  <a:tcPr/>
+                </a:tc>
+                <a:tc>
+                  <a:txBody>
+                    <a:bodyPr/>
+                    <a:lstStyle/>
+                    <a:p>
+                      <a:endParaRPr lang="en-US" sz="900"/>
+                    </a:p>
+                  </a:txBody>
+                  <a:tcPr/>
+                </a:tc>
+                <a:tc>
+                  <a:txBody>
+                    <a:bodyPr/>
+                    <a:lstStyle/>
+                    <a:p>
+                      <a:endParaRPr lang="en-US" sz="900" dirty="0"/>
+                    </a:p>
+                  </a:txBody>
+                  <a:tcPr/>
+                </a:tc>
+                <a:extLst>
+                  <a:ext uri="{0D108BD9-81ED-4DB2-BD59-A6C34878D82A}">
+                    <a16:rowId xmlns:a16="http://schemas.microsoft.com/office/drawing/2014/main" val="2085930501"/>
+                  </a:ext>
+                </a:extLst>
+              </a:tr>
+              <a:tr h="183652">
+                <a:tc>
+                  <a:txBody>
+                    <a:bodyPr/>
+                    <a:lstStyle/>
+                    <a:p>
+                      <a:endParaRPr lang="en-US" sz="900" dirty="0"/>
+                    </a:p>
+                  </a:txBody>
+                  <a:tcPr/>
+                </a:tc>
+                <a:tc>
+                  <a:txBody>
+                    <a:bodyPr/>
+                    <a:lstStyle/>
+                    <a:p>
+                      <a:endParaRPr lang="en-US" sz="900" dirty="0"/>
+                    </a:p>
+                  </a:txBody>
+                  <a:tcPr/>
+                </a:tc>
+                <a:tc>
+                  <a:txBody>
+                    <a:bodyPr/>
+                    <a:lstStyle/>
+                    <a:p>
+                      <a:endParaRPr lang="en-US" sz="900"/>
+                    </a:p>
+                  </a:txBody>
+                  <a:tcPr/>
+                </a:tc>
+                <a:extLst>
+                  <a:ext uri="{0D108BD9-81ED-4DB2-BD59-A6C34878D82A}">
+                    <a16:rowId xmlns:a16="http://schemas.microsoft.com/office/drawing/2014/main" val="3056896336"/>
+                  </a:ext>
+                </a:extLst>
+              </a:tr>
+              <a:tr h="183652">
+                <a:tc>
+                  <a:txBody>
+                    <a:bodyPr/>
+                    <a:lstStyle/>
+                    <a:p>
+                      <a:endParaRPr lang="en-US" sz="900" dirty="0"/>
+                    </a:p>
+                  </a:txBody>
+                  <a:tcPr/>
+                </a:tc>
+                <a:tc>
+                  <a:txBody>
+                    <a:bodyPr/>
+                    <a:lstStyle/>
+                    <a:p>
+                      <a:endParaRPr lang="en-US" sz="900"/>
+                    </a:p>
+                  </a:txBody>
+                  <a:tcPr/>
+                </a:tc>
+                <a:tc>
+                  <a:txBody>
+                    <a:bodyPr/>
+                    <a:lstStyle/>
+                    <a:p>
+                      <a:endParaRPr lang="en-US" sz="900" dirty="0"/>
+                    </a:p>
+                  </a:txBody>
+                  <a:tcPr/>
+                </a:tc>
+                <a:extLst>
+                  <a:ext uri="{0D108BD9-81ED-4DB2-BD59-A6C34878D82A}">
+                    <a16:rowId xmlns:a16="http://schemas.microsoft.com/office/drawing/2014/main" val="4029236202"/>
+                  </a:ext>
+                </a:extLst>
+              </a:tr>
+              <a:tr h="183652">
+                <a:tc>
+                  <a:txBody>
+                    <a:bodyPr/>
+                    <a:lstStyle/>
+                    <a:p>
+                      <a:endParaRPr lang="en-US" sz="900" dirty="0"/>
+                    </a:p>
+                  </a:txBody>
+                  <a:tcPr/>
+                </a:tc>
+                <a:tc>
+                  <a:txBody>
+                    <a:bodyPr/>
+                    <a:lstStyle/>
+                    <a:p>
+                      <a:endParaRPr lang="en-US" sz="900"/>
+                    </a:p>
+                  </a:txBody>
+                  <a:tcPr/>
+                </a:tc>
+                <a:tc>
+                  <a:txBody>
+                    <a:bodyPr/>
+                    <a:lstStyle/>
+                    <a:p>
+                      <a:endParaRPr lang="en-US" sz="900" dirty="0"/>
+                    </a:p>
+                  </a:txBody>
+                  <a:tcPr/>
+                </a:tc>
+                <a:extLst>
+                  <a:ext uri="{0D108BD9-81ED-4DB2-BD59-A6C34878D82A}">
+                    <a16:rowId xmlns:a16="http://schemas.microsoft.com/office/drawing/2014/main" val="302634115"/>
+                  </a:ext>
+                </a:extLst>
+              </a:tr>
+            </a:tbl>
+          </a:graphicData>
+        </a:graphic>
+      </p:graphicFrame>
+      <p:sp>
+        <p:nvSpPr>
+          <p:cNvPr id="8" name="TextBox 7">
+            <a:extLst>
+              <a:ext uri="{FF2B5EF4-FFF2-40B4-BE49-F238E27FC236}">
+                <a16:creationId xmlns:a16="http://schemas.microsoft.com/office/drawing/2014/main" id="{9A5C8814-1134-E64B-A945-FAFB9EBBB85C}"/>
+              </a:ext>
+            </a:extLst>
+          </p:cNvPr>
+          <p:cNvSpPr txBox="1"/>
+          <p:nvPr/>
+        </p:nvSpPr>
+        <p:spPr>
+          <a:xfrm>
+            <a:off x="6790745" y="3958134"/>
+            <a:ext cx="5196508" cy="1231106"/>
+          </a:xfrm>
+          <a:prstGeom prst="rect">
+            <a:avLst/>
+          </a:prstGeom>
+          <a:noFill/>
+          <a:ln>
+            <a:solidFill>
+              <a:schemeClr val="tx1">
+                <a:lumMod val="60000"/>
+                <a:lumOff val="40000"/>
+              </a:schemeClr>
+            </a:solidFill>
+          </a:ln>
+        </p:spPr>
+        <p:txBody>
+          <a:bodyPr wrap="square" rtlCol="0">
+            <a:spAutoFit/>
+          </a:bodyPr>
+          <a:lstStyle/>
+          <a:p>
+            <a:r>
+              <a:rPr lang="en-US" dirty="0">
+                <a:solidFill>
+                  <a:schemeClr val="accent5">
+                    <a:lumMod val="75000"/>
+                  </a:schemeClr>
+                </a:solidFill>
+              </a:rPr>
+              <a:t>#2 Lay entire column into table:   </a:t>
+            </a:r>
+            <a:r>
+              <a:rPr lang="en-US" dirty="0" err="1">
+                <a:solidFill>
+                  <a:srgbClr val="C00000"/>
+                </a:solidFill>
+              </a:rPr>
+              <a:t>col:some.csv</a:t>
+            </a:r>
+            <a:r>
+              <a:rPr lang="en-US" dirty="0">
+                <a:solidFill>
+                  <a:srgbClr val="C00000"/>
+                </a:solidFill>
+              </a:rPr>
+              <a:t>[1]</a:t>
+            </a:r>
+          </a:p>
+          <a:p>
+            <a:pPr marL="285750" indent="-285750">
+              <a:buFont typeface="Arial" panose="020B0604020202020204" pitchFamily="34" charset="0"/>
+              <a:buChar char="•"/>
+            </a:pPr>
+            <a:r>
+              <a:rPr lang="en-US" sz="1400" dirty="0"/>
+              <a:t>Pptx row count is the “master” </a:t>
+            </a:r>
+          </a:p>
+          <a:p>
+            <a:pPr marL="742950" lvl="1" indent="-285750">
+              <a:buFont typeface="Courier New" panose="02070309020205020404" pitchFamily="49" charset="0"/>
+              <a:buChar char="o"/>
+            </a:pPr>
+            <a:r>
+              <a:rPr lang="en-US" sz="1400" dirty="0"/>
+              <a:t>Fewer rows in csv mean blank pptx table rows</a:t>
+            </a:r>
+          </a:p>
+          <a:p>
+            <a:pPr marL="742950" lvl="1" indent="-285750">
+              <a:buFont typeface="Courier New" panose="02070309020205020404" pitchFamily="49" charset="0"/>
+              <a:buChar char="o"/>
+            </a:pPr>
+            <a:r>
+              <a:rPr lang="en-US" sz="1400" dirty="0"/>
+              <a:t>More rows in csv mean some data not shown</a:t>
+            </a:r>
+          </a:p>
+          <a:p>
+            <a:pPr marL="285750" indent="-285750">
+              <a:buFont typeface="Arial" panose="020B0604020202020204" pitchFamily="34" charset="0"/>
+              <a:buChar char="•"/>
+            </a:pPr>
+            <a:r>
+              <a:rPr lang="en-US" sz="1400" dirty="0"/>
+              <a:t>Example table below:</a:t>
+            </a:r>
+          </a:p>
+        </p:txBody>
+      </p:sp>
+      <p:sp>
+        <p:nvSpPr>
+          <p:cNvPr id="9" name="Rectangle 8">
+            <a:extLst>
+              <a:ext uri="{FF2B5EF4-FFF2-40B4-BE49-F238E27FC236}">
+                <a16:creationId xmlns:a16="http://schemas.microsoft.com/office/drawing/2014/main" id="{F51BE0A6-06D5-C945-8D0B-A1920074D601}"/>
+              </a:ext>
+            </a:extLst>
+          </p:cNvPr>
+          <p:cNvSpPr/>
+          <p:nvPr/>
+        </p:nvSpPr>
+        <p:spPr>
+          <a:xfrm>
+            <a:off x="1389487" y="5770160"/>
+            <a:ext cx="4011770" cy="1050876"/>
+          </a:xfrm>
+          <a:prstGeom prst="rect">
+            <a:avLst/>
+          </a:prstGeom>
+          <a:ln>
+            <a:noFill/>
+          </a:ln>
+        </p:spPr>
+        <p:style>
+          <a:lnRef idx="2">
+            <a:schemeClr val="accent1">
+              <a:shade val="50000"/>
+            </a:schemeClr>
+          </a:lnRef>
+          <a:fillRef idx="1">
+            <a:schemeClr val="accent1"/>
+          </a:fillRef>
+          <a:effectRef idx="0">
+            <a:schemeClr val="accent1"/>
+          </a:effectRef>
+          <a:fontRef idx="minor">
+            <a:schemeClr val="lt1"/>
+          </a:fontRef>
+        </p:style>
+        <p:txBody>
+          <a:bodyPr rtlCol="0" anchor="ctr"/>
+          <a:lstStyle/>
+          <a:p>
+            <a:pPr algn="ctr"/>
+            <a:r>
+              <a:rPr lang="en-US" sz="1000" dirty="0"/>
+              <a:t>{{</a:t>
+            </a:r>
+            <a:r>
+              <a:rPr lang="en-US" sz="1000" dirty="0" err="1"/>
+              <a:t>pic:logo.png</a:t>
+            </a:r>
+            <a:r>
+              <a:rPr lang="en-US" sz="1000" dirty="0"/>
+              <a:t>}}</a:t>
+            </a:r>
+          </a:p>
+        </p:txBody>
+      </p:sp>
+      <p:sp>
+        <p:nvSpPr>
+          <p:cNvPr id="10" name="Pentagon 9">
+            <a:extLst>
+              <a:ext uri="{FF2B5EF4-FFF2-40B4-BE49-F238E27FC236}">
+                <a16:creationId xmlns:a16="http://schemas.microsoft.com/office/drawing/2014/main" id="{26FD4FCA-4201-EF4C-A204-A712ECD06D7F}"/>
+              </a:ext>
+            </a:extLst>
+          </p:cNvPr>
+          <p:cNvSpPr/>
+          <p:nvPr/>
+        </p:nvSpPr>
+        <p:spPr>
+          <a:xfrm>
+            <a:off x="8808334" y="11201"/>
+            <a:ext cx="3383666" cy="891433"/>
+          </a:xfrm>
+          <a:prstGeom prst="homePlate">
+            <a:avLst/>
+          </a:prstGeom>
+        </p:spPr>
+        <p:style>
+          <a:lnRef idx="2">
+            <a:schemeClr val="accent5">
+              <a:shade val="50000"/>
+            </a:schemeClr>
+          </a:lnRef>
+          <a:fillRef idx="1">
+            <a:schemeClr val="accent5"/>
+          </a:fillRef>
+          <a:effectRef idx="0">
+            <a:schemeClr val="accent5"/>
+          </a:effectRef>
+          <a:fontRef idx="minor">
+            <a:schemeClr val="lt1"/>
+          </a:fontRef>
+        </p:style>
+        <p:txBody>
+          <a:bodyPr rtlCol="0" anchor="ctr"/>
+          <a:lstStyle/>
+          <a:p>
+            <a:pPr algn="ctr"/>
+            <a:r>
+              <a:rPr lang="en-US" dirty="0"/>
+              <a:t>Open “</a:t>
+            </a:r>
+            <a:r>
+              <a:rPr lang="en-US" dirty="0" err="1"/>
+              <a:t>example.csv</a:t>
+            </a:r>
+            <a:r>
+              <a:rPr lang="en-US" dirty="0"/>
+              <a:t>” while looking at examples below</a:t>
+            </a:r>
+          </a:p>
+          <a:p>
+            <a:pPr algn="ctr"/>
+            <a:r>
+              <a:rPr lang="en-US" sz="1100" dirty="0"/>
+              <a:t>In folder: “2_download/&lt;system&gt;/demo/”</a:t>
+            </a:r>
+          </a:p>
+        </p:txBody>
+      </p:sp>
+    </p:spTree>
+    <p:extLst>
+      <p:ext uri="{BB962C8B-B14F-4D97-AF65-F5344CB8AC3E}">
+        <p14:creationId xmlns:p14="http://schemas.microsoft.com/office/powerpoint/2010/main" val="2902381535"/>
       </p:ext>
     </p:extLst>
   </p:cSld>

</xml_diff>